<commit_message>
filled out nb_conversion section
</commit_message>
<xml_diff>
--- a/docs/source/_static/process.pptx
+++ b/docs/source/_static/process.pptx
@@ -107,6 +107,11 @@
       </a:defRPr>
     </a:lvl9pPr>
   </p:defaultTextStyle>
+  <p:extLst>
+    <p:ext uri="{EFAFB233-063F-42B5-8137-9DF3F51BA10A}">
+      <p15:sldGuideLst xmlns:p15="http://schemas.microsoft.com/office/powerpoint/2012/main"/>
+    </p:ext>
+  </p:extLst>
 </p:presentation>
 </file>
 
@@ -192,7 +197,7 @@
           <a:p>
             <a:fld id="{311FD1EF-4BDE-5848-8905-E59AF9DFCD71}" type="datetimeFigureOut">
               <a:rPr lang="en-GB" smtClean="0"/>
-              <a:t>29/01/2019</a:t>
+              <a:t>20/02/2019</a:t>
             </a:fld>
             <a:endParaRPr lang="en-GB"/>
           </a:p>
@@ -680,7 +685,7 @@
           <a:p>
             <a:fld id="{A8D65590-5FF4-DF4F-AE90-F41104859259}" type="datetimeFigureOut">
               <a:rPr lang="en-GB" smtClean="0"/>
-              <a:t>29/01/2019</a:t>
+              <a:t>20/02/2019</a:t>
             </a:fld>
             <a:endParaRPr lang="en-GB"/>
           </a:p>
@@ -850,7 +855,7 @@
           <a:p>
             <a:fld id="{A8D65590-5FF4-DF4F-AE90-F41104859259}" type="datetimeFigureOut">
               <a:rPr lang="en-GB" smtClean="0"/>
-              <a:t>29/01/2019</a:t>
+              <a:t>20/02/2019</a:t>
             </a:fld>
             <a:endParaRPr lang="en-GB"/>
           </a:p>
@@ -1030,7 +1035,7 @@
           <a:p>
             <a:fld id="{A8D65590-5FF4-DF4F-AE90-F41104859259}" type="datetimeFigureOut">
               <a:rPr lang="en-GB" smtClean="0"/>
-              <a:t>29/01/2019</a:t>
+              <a:t>20/02/2019</a:t>
             </a:fld>
             <a:endParaRPr lang="en-GB"/>
           </a:p>
@@ -1200,7 +1205,7 @@
           <a:p>
             <a:fld id="{A8D65590-5FF4-DF4F-AE90-F41104859259}" type="datetimeFigureOut">
               <a:rPr lang="en-GB" smtClean="0"/>
-              <a:t>29/01/2019</a:t>
+              <a:t>20/02/2019</a:t>
             </a:fld>
             <a:endParaRPr lang="en-GB"/>
           </a:p>
@@ -1444,7 +1449,7 @@
           <a:p>
             <a:fld id="{A8D65590-5FF4-DF4F-AE90-F41104859259}" type="datetimeFigureOut">
               <a:rPr lang="en-GB" smtClean="0"/>
-              <a:t>29/01/2019</a:t>
+              <a:t>20/02/2019</a:t>
             </a:fld>
             <a:endParaRPr lang="en-GB"/>
           </a:p>
@@ -1676,7 +1681,7 @@
           <a:p>
             <a:fld id="{A8D65590-5FF4-DF4F-AE90-F41104859259}" type="datetimeFigureOut">
               <a:rPr lang="en-GB" smtClean="0"/>
-              <a:t>29/01/2019</a:t>
+              <a:t>20/02/2019</a:t>
             </a:fld>
             <a:endParaRPr lang="en-GB"/>
           </a:p>
@@ -2043,7 +2048,7 @@
           <a:p>
             <a:fld id="{A8D65590-5FF4-DF4F-AE90-F41104859259}" type="datetimeFigureOut">
               <a:rPr lang="en-GB" smtClean="0"/>
-              <a:t>29/01/2019</a:t>
+              <a:t>20/02/2019</a:t>
             </a:fld>
             <a:endParaRPr lang="en-GB"/>
           </a:p>
@@ -2161,7 +2166,7 @@
           <a:p>
             <a:fld id="{A8D65590-5FF4-DF4F-AE90-F41104859259}" type="datetimeFigureOut">
               <a:rPr lang="en-GB" smtClean="0"/>
-              <a:t>29/01/2019</a:t>
+              <a:t>20/02/2019</a:t>
             </a:fld>
             <a:endParaRPr lang="en-GB"/>
           </a:p>
@@ -2256,7 +2261,7 @@
           <a:p>
             <a:fld id="{A8D65590-5FF4-DF4F-AE90-F41104859259}" type="datetimeFigureOut">
               <a:rPr lang="en-GB" smtClean="0"/>
-              <a:t>29/01/2019</a:t>
+              <a:t>20/02/2019</a:t>
             </a:fld>
             <a:endParaRPr lang="en-GB"/>
           </a:p>
@@ -2533,7 +2538,7 @@
           <a:p>
             <a:fld id="{A8D65590-5FF4-DF4F-AE90-F41104859259}" type="datetimeFigureOut">
               <a:rPr lang="en-GB" smtClean="0"/>
-              <a:t>29/01/2019</a:t>
+              <a:t>20/02/2019</a:t>
             </a:fld>
             <a:endParaRPr lang="en-GB"/>
           </a:p>
@@ -2790,7 +2795,7 @@
           <a:p>
             <a:fld id="{A8D65590-5FF4-DF4F-AE90-F41104859259}" type="datetimeFigureOut">
               <a:rPr lang="en-GB" smtClean="0"/>
-              <a:t>29/01/2019</a:t>
+              <a:t>20/02/2019</a:t>
             </a:fld>
             <a:endParaRPr lang="en-GB"/>
           </a:p>
@@ -3003,7 +3008,7 @@
           <a:p>
             <a:fld id="{A8D65590-5FF4-DF4F-AE90-F41104859259}" type="datetimeFigureOut">
               <a:rPr lang="en-GB" smtClean="0"/>
-              <a:t>29/01/2019</a:t>
+              <a:t>20/02/2019</a:t>
             </a:fld>
             <a:endParaRPr lang="en-GB"/>
           </a:p>
@@ -3466,8 +3471,8 @@
         </p:nvSpPr>
         <p:spPr>
           <a:xfrm>
-            <a:off x="1685925" y="1122778"/>
-            <a:ext cx="2769365" cy="648872"/>
+            <a:off x="948107" y="1122778"/>
+            <a:ext cx="3507184" cy="648872"/>
           </a:xfrm>
           <a:prstGeom prst="roundRect">
             <a:avLst/>
@@ -3648,10 +3653,10 @@
       </p:sp>
       <p:sp>
         <p:nvSpPr>
-          <p:cNvPr id="8" name="Oval 7">
+          <p:cNvPr id="9" name="Rounded Rectangle 8">
             <a:extLst>
               <a:ext uri="{FF2B5EF4-FFF2-40B4-BE49-F238E27FC236}">
-                <a16:creationId xmlns:a16="http://schemas.microsoft.com/office/drawing/2014/main" id="{3313CC24-6807-0049-970F-FCB37B24DABE}"/>
+                <a16:creationId xmlns:a16="http://schemas.microsoft.com/office/drawing/2014/main" id="{11F0B02B-081A-1F44-A153-31BDB885A16D}"/>
               </a:ext>
             </a:extLst>
           </p:cNvPr>
@@ -3660,8 +3665,69 @@
         </p:nvSpPr>
         <p:spPr>
           <a:xfrm>
-            <a:off x="1771804" y="2046502"/>
-            <a:ext cx="1206812" cy="1138996"/>
+            <a:off x="3326300" y="2046502"/>
+            <a:ext cx="977817" cy="1138996"/>
+          </a:xfrm>
+          <a:prstGeom prst="roundRect">
+            <a:avLst/>
+          </a:prstGeom>
+        </p:spPr>
+        <p:style>
+          <a:lnRef idx="2">
+            <a:schemeClr val="accent1">
+              <a:shade val="50000"/>
+            </a:schemeClr>
+          </a:lnRef>
+          <a:fillRef idx="1">
+            <a:schemeClr val="accent1"/>
+          </a:fillRef>
+          <a:effectRef idx="0">
+            <a:schemeClr val="accent1"/>
+          </a:effectRef>
+          <a:fontRef idx="minor">
+            <a:schemeClr val="lt1"/>
+          </a:fontRef>
+        </p:style>
+        <p:txBody>
+          <a:bodyPr rot="0" spcFirstLastPara="0" vertOverflow="overflow" horzOverflow="overflow" vert="horz" wrap="square" lIns="71993" tIns="35997" rIns="71993" bIns="35997" numCol="1" spcCol="0" rtlCol="0" fromWordArt="0" anchor="ctr" anchorCtr="0" forceAA="0" compatLnSpc="1">
+            <a:prstTxWarp prst="textNoShape">
+              <a:avLst/>
+            </a:prstTxWarp>
+            <a:noAutofit/>
+          </a:bodyPr>
+          <a:lstStyle/>
+          <a:p>
+            <a:pPr algn="ctr"/>
+            <a:r>
+              <a:rPr lang="en-GB" sz="1417" dirty="0"/>
+              <a:t>Modified</a:t>
+            </a:r>
+          </a:p>
+          <a:p>
+            <a:pPr algn="ctr"/>
+            <a:r>
+              <a:rPr lang="en-GB" sz="1417" dirty="0"/>
+              <a:t>Jupyter Notebook</a:t>
+            </a:r>
+          </a:p>
+        </p:txBody>
+      </p:sp>
+      <p:sp>
+        <p:nvSpPr>
+          <p:cNvPr id="10" name="Oval 9">
+            <a:extLst>
+              <a:ext uri="{FF2B5EF4-FFF2-40B4-BE49-F238E27FC236}">
+                <a16:creationId xmlns:a16="http://schemas.microsoft.com/office/drawing/2014/main" id="{02317CFC-077C-ED41-80B0-BEDF53476F50}"/>
+              </a:ext>
+            </a:extLst>
+          </p:cNvPr>
+          <p:cNvSpPr/>
+          <p:nvPr/>
+        </p:nvSpPr>
+        <p:spPr>
+          <a:xfrm>
+            <a:off x="4651800" y="3381983"/>
+            <a:ext cx="1086707" cy="1181977"/>
           </a:xfrm>
           <a:prstGeom prst="ellipse">
             <a:avLst/>
@@ -3695,17 +3761,17 @@
             <a:pPr algn="ctr"/>
             <a:r>
               <a:rPr lang="en-GB" sz="1417" dirty="0"/>
-              <a:t>Merge &amp; Apply Pre-Processors</a:t>
-            </a:r>
-          </a:p>
-        </p:txBody>
-      </p:sp>
-      <p:sp>
-        <p:nvSpPr>
-          <p:cNvPr id="9" name="Rounded Rectangle 8">
+              <a:t>Apply Jinja Template</a:t>
+            </a:r>
+          </a:p>
+        </p:txBody>
+      </p:sp>
+      <p:sp>
+        <p:nvSpPr>
+          <p:cNvPr id="11" name="Rounded Rectangle 10">
             <a:extLst>
               <a:ext uri="{FF2B5EF4-FFF2-40B4-BE49-F238E27FC236}">
-                <a16:creationId xmlns:a16="http://schemas.microsoft.com/office/drawing/2014/main" id="{11F0B02B-081A-1F44-A153-31BDB885A16D}"/>
+                <a16:creationId xmlns:a16="http://schemas.microsoft.com/office/drawing/2014/main" id="{7698D683-9F77-B24A-ADB9-114C303DAFD1}"/>
               </a:ext>
             </a:extLst>
           </p:cNvPr>
@@ -3714,8 +3780,8 @@
         </p:nvSpPr>
         <p:spPr>
           <a:xfrm>
-            <a:off x="3326300" y="2046502"/>
-            <a:ext cx="977817" cy="1138996"/>
+            <a:off x="3326300" y="3308728"/>
+            <a:ext cx="977817" cy="660020"/>
           </a:xfrm>
           <a:prstGeom prst="roundRect">
             <a:avLst/>
@@ -3749,24 +3815,21 @@
             <a:pPr algn="ctr"/>
             <a:r>
               <a:rPr lang="en-GB" sz="1417" dirty="0"/>
-              <a:t>Modified</a:t>
-            </a:r>
-          </a:p>
-          <a:p>
-            <a:pPr algn="ctr"/>
-            <a:r>
-              <a:rPr lang="en-GB" sz="1417" dirty="0"/>
-              <a:t>Jupyter Notebook</a:t>
-            </a:r>
-          </a:p>
-        </p:txBody>
-      </p:sp>
-      <p:sp>
-        <p:nvSpPr>
-          <p:cNvPr id="10" name="Oval 9">
+              <a:t>Text Based File </a:t>
+            </a:r>
+            <a:r>
+              <a:rPr lang="en-GB" sz="945" dirty="0"/>
+              <a:t>(Tex, Html, …)</a:t>
+            </a:r>
+          </a:p>
+        </p:txBody>
+      </p:sp>
+      <p:sp>
+        <p:nvSpPr>
+          <p:cNvPr id="12" name="Oval 11">
             <a:extLst>
               <a:ext uri="{FF2B5EF4-FFF2-40B4-BE49-F238E27FC236}">
-                <a16:creationId xmlns:a16="http://schemas.microsoft.com/office/drawing/2014/main" id="{02317CFC-077C-ED41-80B0-BEDF53476F50}"/>
+                <a16:creationId xmlns:a16="http://schemas.microsoft.com/office/drawing/2014/main" id="{79EAFCF2-3D78-504C-A4BF-6711813BD924}"/>
               </a:ext>
             </a:extLst>
           </p:cNvPr>
@@ -3775,8 +3838,8 @@
         </p:nvSpPr>
         <p:spPr>
           <a:xfrm>
-            <a:off x="4651800" y="3381983"/>
-            <a:ext cx="1086707" cy="1181977"/>
+            <a:off x="1737644" y="3393592"/>
+            <a:ext cx="1240972" cy="1138996"/>
           </a:xfrm>
           <a:prstGeom prst="ellipse">
             <a:avLst/>
@@ -3810,124 +3873,24 @@
             <a:pPr algn="ctr"/>
             <a:r>
               <a:rPr lang="en-GB" sz="1417" dirty="0"/>
-              <a:t>Apply Jinja Template</a:t>
-            </a:r>
-          </a:p>
-        </p:txBody>
-      </p:sp>
-      <p:sp>
-        <p:nvSpPr>
-          <p:cNvPr id="11" name="Rounded Rectangle 10">
-            <a:extLst>
-              <a:ext uri="{FF2B5EF4-FFF2-40B4-BE49-F238E27FC236}">
-                <a16:creationId xmlns:a16="http://schemas.microsoft.com/office/drawing/2014/main" id="{7698D683-9F77-B24A-ADB9-114C303DAFD1}"/>
-              </a:ext>
-            </a:extLst>
-          </p:cNvPr>
-          <p:cNvSpPr/>
-          <p:nvPr/>
-        </p:nvSpPr>
-        <p:spPr>
-          <a:xfrm>
-            <a:off x="3326300" y="3308728"/>
-            <a:ext cx="977817" cy="660020"/>
-          </a:xfrm>
-          <a:prstGeom prst="roundRect">
-            <a:avLst/>
-          </a:prstGeom>
-        </p:spPr>
-        <p:style>
-          <a:lnRef idx="2">
-            <a:schemeClr val="accent1">
-              <a:shade val="50000"/>
-            </a:schemeClr>
-          </a:lnRef>
-          <a:fillRef idx="1">
-            <a:schemeClr val="accent1"/>
-          </a:fillRef>
-          <a:effectRef idx="0">
-            <a:schemeClr val="accent1"/>
-          </a:effectRef>
-          <a:fontRef idx="minor">
-            <a:schemeClr val="lt1"/>
-          </a:fontRef>
-        </p:style>
-        <p:txBody>
-          <a:bodyPr rot="0" spcFirstLastPara="0" vertOverflow="overflow" horzOverflow="overflow" vert="horz" wrap="square" lIns="71993" tIns="35997" rIns="71993" bIns="35997" numCol="1" spcCol="0" rtlCol="0" fromWordArt="0" anchor="ctr" anchorCtr="0" forceAA="0" compatLnSpc="1">
-            <a:prstTxWarp prst="textNoShape">
-              <a:avLst/>
-            </a:prstTxWarp>
-            <a:noAutofit/>
-          </a:bodyPr>
-          <a:lstStyle/>
+              <a:t>Post-Processing</a:t>
+            </a:r>
+          </a:p>
           <a:p>
             <a:pPr algn="ctr"/>
             <a:r>
-              <a:rPr lang="en-GB" sz="1417" dirty="0"/>
-              <a:t>Text Based File </a:t>
-            </a:r>
-            <a:r>
-              <a:rPr lang="en-GB" sz="945" dirty="0"/>
-              <a:t>(Tex, Html, …)</a:t>
-            </a:r>
-          </a:p>
-        </p:txBody>
-      </p:sp>
-      <p:sp>
-        <p:nvSpPr>
-          <p:cNvPr id="12" name="Oval 11">
-            <a:extLst>
-              <a:ext uri="{FF2B5EF4-FFF2-40B4-BE49-F238E27FC236}">
-                <a16:creationId xmlns:a16="http://schemas.microsoft.com/office/drawing/2014/main" id="{79EAFCF2-3D78-504C-A4BF-6711813BD924}"/>
-              </a:ext>
-            </a:extLst>
-          </p:cNvPr>
-          <p:cNvSpPr/>
-          <p:nvPr/>
-        </p:nvSpPr>
-        <p:spPr>
-          <a:xfrm>
-            <a:off x="1737644" y="3393592"/>
-            <a:ext cx="1240972" cy="1138996"/>
-          </a:xfrm>
-          <a:prstGeom prst="ellipse">
-            <a:avLst/>
-          </a:prstGeom>
-        </p:spPr>
-        <p:style>
-          <a:lnRef idx="2">
-            <a:schemeClr val="accent2">
-              <a:shade val="50000"/>
-            </a:schemeClr>
-          </a:lnRef>
-          <a:fillRef idx="1">
-            <a:schemeClr val="accent2"/>
-          </a:fillRef>
-          <a:effectRef idx="0">
-            <a:schemeClr val="accent2"/>
-          </a:effectRef>
-          <a:fontRef idx="minor">
-            <a:schemeClr val="lt1"/>
-          </a:fontRef>
-        </p:style>
-        <p:txBody>
-          <a:bodyPr rot="0" spcFirstLastPara="0" vertOverflow="overflow" horzOverflow="overflow" vert="horz" wrap="square" lIns="28344" tIns="35997" rIns="28344" bIns="35997" numCol="1" spcCol="0" rtlCol="0" fromWordArt="0" anchor="ctr" anchorCtr="0" forceAA="0" compatLnSpc="1">
-            <a:prstTxWarp prst="textNoShape">
-              <a:avLst/>
-            </a:prstTxWarp>
-            <a:noAutofit/>
-          </a:bodyPr>
-          <a:lstStyle/>
-          <a:p>
-            <a:pPr algn="ctr"/>
-            <a:r>
-              <a:rPr lang="en-GB" sz="1417" dirty="0" err="1"/>
+              <a:rPr lang="en-GB" sz="1100" dirty="0"/>
+              <a:t>(e.g. </a:t>
+            </a:r>
+            <a:r>
+              <a:rPr lang="en-GB" sz="1100" dirty="0" err="1"/>
               <a:t>LaTeX</a:t>
             </a:r>
             <a:r>
-              <a:rPr lang="en-GB" sz="1417" dirty="0"/>
-              <a:t> Conversion</a:t>
-            </a:r>
+              <a:rPr lang="en-GB" sz="1100" dirty="0"/>
+              <a:t> Conversion)</a:t>
+            </a:r>
+            <a:endParaRPr lang="en-GB" sz="1417" dirty="0"/>
           </a:p>
         </p:txBody>
       </p:sp>
@@ -3980,7 +3943,14 @@
             <a:pPr algn="ctr"/>
             <a:r>
               <a:rPr lang="en-GB" sz="1417" dirty="0"/>
-              <a:t>PDF Document</a:t>
+              <a:t>Final Output</a:t>
+            </a:r>
+          </a:p>
+          <a:p>
+            <a:pPr algn="ctr"/>
+            <a:r>
+              <a:rPr lang="en-GB" sz="1100" dirty="0"/>
+              <a:t>(e.g. PDF)</a:t>
             </a:r>
           </a:p>
         </p:txBody>
@@ -4524,8 +4494,8 @@
         </p:nvSpPr>
         <p:spPr>
           <a:xfrm>
-            <a:off x="1728934" y="1178390"/>
-            <a:ext cx="1292555" cy="533520"/>
+            <a:off x="997550" y="1178390"/>
+            <a:ext cx="1162742" cy="533520"/>
           </a:xfrm>
           <a:prstGeom prst="roundRect">
             <a:avLst/>
@@ -4548,7 +4518,7 @@
           </a:fontRef>
         </p:style>
         <p:txBody>
-          <a:bodyPr rot="0" spcFirstLastPara="0" vertOverflow="overflow" horzOverflow="overflow" vert="horz" wrap="square" lIns="71993" tIns="35997" rIns="71993" bIns="35997" numCol="1" spcCol="0" rtlCol="0" fromWordArt="0" anchor="ctr" anchorCtr="0" forceAA="0" compatLnSpc="1">
+          <a:bodyPr rot="0" spcFirstLastPara="0" vertOverflow="overflow" horzOverflow="overflow" vert="horz" wrap="square" lIns="36000" tIns="35997" rIns="36000" bIns="35997" numCol="1" spcCol="0" rtlCol="0" fromWordArt="0" anchor="ctr" anchorCtr="0" forceAA="0" compatLnSpc="1">
             <a:prstTxWarp prst="textNoShape">
               <a:avLst/>
             </a:prstTxWarp>
@@ -4582,8 +4552,8 @@
         </p:nvSpPr>
         <p:spPr>
           <a:xfrm>
-            <a:off x="3129051" y="1178390"/>
-            <a:ext cx="1292555" cy="533520"/>
+            <a:off x="3554959" y="1178390"/>
+            <a:ext cx="866647" cy="533520"/>
           </a:xfrm>
           <a:prstGeom prst="roundRect">
             <a:avLst/>
@@ -4606,7 +4576,7 @@
           </a:fontRef>
         </p:style>
         <p:txBody>
-          <a:bodyPr rot="0" spcFirstLastPara="0" vertOverflow="overflow" horzOverflow="overflow" vert="horz" wrap="square" lIns="71993" tIns="35997" rIns="71993" bIns="35997" numCol="1" spcCol="0" rtlCol="0" fromWordArt="0" anchor="ctr" anchorCtr="0" forceAA="0" compatLnSpc="1">
+          <a:bodyPr rot="0" spcFirstLastPara="0" vertOverflow="overflow" horzOverflow="overflow" vert="horz" wrap="square" lIns="36000" tIns="35997" rIns="36000" bIns="35997" numCol="1" spcCol="0" rtlCol="0" fromWordArt="0" anchor="ctr" anchorCtr="0" forceAA="0" compatLnSpc="1">
             <a:prstTxWarp prst="textNoShape">
               <a:avLst/>
             </a:prstTxWarp>
@@ -4754,14 +4724,14 @@
           <p:cNvCxnSpPr>
             <a:cxnSpLocks/>
             <a:stCxn id="70" idx="2"/>
-            <a:endCxn id="8" idx="0"/>
+            <a:endCxn id="8" idx="1"/>
           </p:cNvCxnSpPr>
           <p:nvPr/>
         </p:nvCxnSpPr>
         <p:spPr>
           <a:xfrm>
-            <a:off x="2375210" y="1711910"/>
-            <a:ext cx="0" cy="334592"/>
+            <a:off x="1578921" y="1711910"/>
+            <a:ext cx="369617" cy="501394"/>
           </a:xfrm>
           <a:prstGeom prst="straightConnector1">
             <a:avLst/>
@@ -4806,8 +4776,8 @@
         </p:nvCxnSpPr>
         <p:spPr>
           <a:xfrm>
-            <a:off x="4421606" y="1445152"/>
-            <a:ext cx="773547" cy="1936831"/>
+            <a:off x="4421606" y="1445150"/>
+            <a:ext cx="773548" cy="1936833"/>
           </a:xfrm>
           <a:prstGeom prst="bentConnector2">
             <a:avLst/>
@@ -4974,52 +4944,6 @@
       </p:cxnSp>
       <p:cxnSp>
         <p:nvCxnSpPr>
-          <p:cNvPr id="99" name="Straight Arrow Connector 98">
-            <a:extLst>
-              <a:ext uri="{FF2B5EF4-FFF2-40B4-BE49-F238E27FC236}">
-                <a16:creationId xmlns:a16="http://schemas.microsoft.com/office/drawing/2014/main" id="{0DC6BC67-8414-7D46-9524-ABB71C9869C5}"/>
-              </a:ext>
-            </a:extLst>
-          </p:cNvPr>
-          <p:cNvCxnSpPr>
-            <a:cxnSpLocks/>
-            <a:stCxn id="55" idx="2"/>
-            <a:endCxn id="70" idx="0"/>
-          </p:cNvCxnSpPr>
-          <p:nvPr/>
-        </p:nvCxnSpPr>
-        <p:spPr>
-          <a:xfrm flipH="1">
-            <a:off x="2375213" y="875653"/>
-            <a:ext cx="4355" cy="302739"/>
-          </a:xfrm>
-          <a:prstGeom prst="straightConnector1">
-            <a:avLst/>
-          </a:prstGeom>
-          <a:ln w="76200">
-            <a:solidFill>
-              <a:schemeClr val="accent6"/>
-            </a:solidFill>
-            <a:tailEnd type="triangle"/>
-          </a:ln>
-        </p:spPr>
-        <p:style>
-          <a:lnRef idx="1">
-            <a:schemeClr val="accent1"/>
-          </a:lnRef>
-          <a:fillRef idx="0">
-            <a:schemeClr val="accent1"/>
-          </a:fillRef>
-          <a:effectRef idx="0">
-            <a:schemeClr val="accent1"/>
-          </a:effectRef>
-          <a:fontRef idx="minor">
-            <a:schemeClr val="tx1"/>
-          </a:fontRef>
-        </p:style>
-      </p:cxnSp>
-      <p:cxnSp>
-        <p:nvCxnSpPr>
           <p:cNvPr id="105" name="Elbow Connector 104">
             <a:extLst>
               <a:ext uri="{FF2B5EF4-FFF2-40B4-BE49-F238E27FC236}">
@@ -5030,14 +4954,13 @@
           <p:cNvCxnSpPr>
             <a:cxnSpLocks/>
             <a:stCxn id="55" idx="3"/>
-            <a:endCxn id="71" idx="0"/>
           </p:cNvCxnSpPr>
           <p:nvPr/>
         </p:nvCxnSpPr>
         <p:spPr>
           <a:xfrm>
-            <a:off x="3021488" y="608895"/>
-            <a:ext cx="753840" cy="569497"/>
+            <a:off x="3021487" y="608892"/>
+            <a:ext cx="401517" cy="513886"/>
           </a:xfrm>
           <a:prstGeom prst="bentConnector2">
             <a:avLst/>
@@ -5261,6 +5184,164 @@
             <a:r>
               <a:rPr lang="en-GB" sz="945" dirty="0"/>
               <a:t>bibliography etc</a:t>
+            </a:r>
+          </a:p>
+        </p:txBody>
+      </p:sp>
+      <p:sp>
+        <p:nvSpPr>
+          <p:cNvPr id="41" name="Rounded Rectangle 40">
+            <a:extLst>
+              <a:ext uri="{FF2B5EF4-FFF2-40B4-BE49-F238E27FC236}">
+                <a16:creationId xmlns:a16="http://schemas.microsoft.com/office/drawing/2014/main" id="{CD991796-3459-C44E-9106-71265B700780}"/>
+              </a:ext>
+            </a:extLst>
+          </p:cNvPr>
+          <p:cNvSpPr/>
+          <p:nvPr/>
+        </p:nvSpPr>
+        <p:spPr>
+          <a:xfrm>
+            <a:off x="2238016" y="1174168"/>
+            <a:ext cx="1263106" cy="533520"/>
+          </a:xfrm>
+          <a:prstGeom prst="roundRect">
+            <a:avLst/>
+          </a:prstGeom>
+        </p:spPr>
+        <p:style>
+          <a:lnRef idx="2">
+            <a:schemeClr val="accent4">
+              <a:shade val="50000"/>
+            </a:schemeClr>
+          </a:lnRef>
+          <a:fillRef idx="1">
+            <a:schemeClr val="accent4"/>
+          </a:fillRef>
+          <a:effectRef idx="0">
+            <a:schemeClr val="accent4"/>
+          </a:effectRef>
+          <a:fontRef idx="minor">
+            <a:schemeClr val="lt1"/>
+          </a:fontRef>
+        </p:style>
+        <p:txBody>
+          <a:bodyPr rot="0" spcFirstLastPara="0" vertOverflow="overflow" horzOverflow="overflow" vert="horz" wrap="square" lIns="36000" tIns="35997" rIns="36000" bIns="35997" numCol="1" spcCol="0" rtlCol="0" fromWordArt="0" anchor="ctr" anchorCtr="0" forceAA="0" compatLnSpc="1">
+            <a:prstTxWarp prst="textNoShape">
+              <a:avLst/>
+            </a:prstTxWarp>
+            <a:noAutofit/>
+          </a:bodyPr>
+          <a:lstStyle/>
+          <a:p>
+            <a:pPr algn="ctr"/>
+            <a:r>
+              <a:rPr lang="en-GB" sz="1417" dirty="0">
+                <a:solidFill>
+                  <a:schemeClr val="tx1"/>
+                </a:solidFill>
+              </a:rPr>
+              <a:t>Post-Processor Classes</a:t>
+            </a:r>
+          </a:p>
+        </p:txBody>
+      </p:sp>
+      <p:cxnSp>
+        <p:nvCxnSpPr>
+          <p:cNvPr id="51" name="Straight Arrow Connector 50">
+            <a:extLst>
+              <a:ext uri="{FF2B5EF4-FFF2-40B4-BE49-F238E27FC236}">
+                <a16:creationId xmlns:a16="http://schemas.microsoft.com/office/drawing/2014/main" id="{B742822B-0706-B34A-807D-614848548445}"/>
+              </a:ext>
+            </a:extLst>
+          </p:cNvPr>
+          <p:cNvCxnSpPr>
+            <a:cxnSpLocks/>
+            <a:stCxn id="41" idx="2"/>
+            <a:endCxn id="12" idx="7"/>
+          </p:cNvCxnSpPr>
+          <p:nvPr/>
+        </p:nvCxnSpPr>
+        <p:spPr>
+          <a:xfrm flipH="1">
+            <a:off x="2796880" y="1707688"/>
+            <a:ext cx="72689" cy="1852706"/>
+          </a:xfrm>
+          <a:prstGeom prst="straightConnector1">
+            <a:avLst/>
+          </a:prstGeom>
+          <a:ln w="76200">
+            <a:solidFill>
+              <a:schemeClr val="accent4"/>
+            </a:solidFill>
+            <a:tailEnd type="triangle"/>
+          </a:ln>
+        </p:spPr>
+        <p:style>
+          <a:lnRef idx="1">
+            <a:schemeClr val="accent1"/>
+          </a:lnRef>
+          <a:fillRef idx="0">
+            <a:schemeClr val="accent1"/>
+          </a:fillRef>
+          <a:effectRef idx="0">
+            <a:schemeClr val="accent1"/>
+          </a:effectRef>
+          <a:fontRef idx="minor">
+            <a:schemeClr val="tx1"/>
+          </a:fontRef>
+        </p:style>
+      </p:cxnSp>
+      <p:sp>
+        <p:nvSpPr>
+          <p:cNvPr id="8" name="Oval 7">
+            <a:extLst>
+              <a:ext uri="{FF2B5EF4-FFF2-40B4-BE49-F238E27FC236}">
+                <a16:creationId xmlns:a16="http://schemas.microsoft.com/office/drawing/2014/main" id="{3313CC24-6807-0049-970F-FCB37B24DABE}"/>
+              </a:ext>
+            </a:extLst>
+          </p:cNvPr>
+          <p:cNvSpPr/>
+          <p:nvPr/>
+        </p:nvSpPr>
+        <p:spPr>
+          <a:xfrm>
+            <a:off x="1771804" y="2046502"/>
+            <a:ext cx="1206812" cy="1138996"/>
+          </a:xfrm>
+          <a:prstGeom prst="ellipse">
+            <a:avLst/>
+          </a:prstGeom>
+        </p:spPr>
+        <p:style>
+          <a:lnRef idx="2">
+            <a:schemeClr val="accent2">
+              <a:shade val="50000"/>
+            </a:schemeClr>
+          </a:lnRef>
+          <a:fillRef idx="1">
+            <a:schemeClr val="accent2"/>
+          </a:fillRef>
+          <a:effectRef idx="0">
+            <a:schemeClr val="accent2"/>
+          </a:effectRef>
+          <a:fontRef idx="minor">
+            <a:schemeClr val="lt1"/>
+          </a:fontRef>
+        </p:style>
+        <p:txBody>
+          <a:bodyPr rot="0" spcFirstLastPara="0" vertOverflow="overflow" horzOverflow="overflow" vert="horz" wrap="square" lIns="28344" tIns="35997" rIns="28344" bIns="35997" numCol="1" spcCol="0" rtlCol="0" fromWordArt="0" anchor="ctr" anchorCtr="0" forceAA="0" compatLnSpc="1">
+            <a:prstTxWarp prst="textNoShape">
+              <a:avLst/>
+            </a:prstTxWarp>
+            <a:noAutofit/>
+          </a:bodyPr>
+          <a:lstStyle/>
+          <a:p>
+            <a:pPr algn="ctr"/>
+            <a:r>
+              <a:rPr lang="en-GB" sz="1417" dirty="0"/>
+              <a:t>Merge &amp; Apply Pre-Processors</a:t>
             </a:r>
           </a:p>
         </p:txBody>

</xml_diff>

<commit_message>
version 0.9 release (#67)
- Added ``ipubpandoc`` (see :ref:`markdown_cells`)
- Refactored conversion process to
  :py:class:`ipypublish.convert.main.IpyPubMain` configurable class
- Added postprocessors (see :ref:`post-processors`)
- Added Sphinx extension (see :ref:`sphinx_extension`)
- Added Binder examples to documentation (see :ref:`code_cells`)
</commit_message>
<xml_diff>
--- a/docs/source/_static/process.pptx
+++ b/docs/source/_static/process.pptx
@@ -107,6 +107,11 @@
       </a:defRPr>
     </a:lvl9pPr>
   </p:defaultTextStyle>
+  <p:extLst>
+    <p:ext uri="{EFAFB233-063F-42B5-8137-9DF3F51BA10A}">
+      <p15:sldGuideLst xmlns:p15="http://schemas.microsoft.com/office/powerpoint/2012/main"/>
+    </p:ext>
+  </p:extLst>
 </p:presentation>
 </file>
 
@@ -192,7 +197,7 @@
           <a:p>
             <a:fld id="{311FD1EF-4BDE-5848-8905-E59AF9DFCD71}" type="datetimeFigureOut">
               <a:rPr lang="en-GB" smtClean="0"/>
-              <a:t>29/01/2019</a:t>
+              <a:t>20/02/2019</a:t>
             </a:fld>
             <a:endParaRPr lang="en-GB"/>
           </a:p>
@@ -680,7 +685,7 @@
           <a:p>
             <a:fld id="{A8D65590-5FF4-DF4F-AE90-F41104859259}" type="datetimeFigureOut">
               <a:rPr lang="en-GB" smtClean="0"/>
-              <a:t>29/01/2019</a:t>
+              <a:t>20/02/2019</a:t>
             </a:fld>
             <a:endParaRPr lang="en-GB"/>
           </a:p>
@@ -850,7 +855,7 @@
           <a:p>
             <a:fld id="{A8D65590-5FF4-DF4F-AE90-F41104859259}" type="datetimeFigureOut">
               <a:rPr lang="en-GB" smtClean="0"/>
-              <a:t>29/01/2019</a:t>
+              <a:t>20/02/2019</a:t>
             </a:fld>
             <a:endParaRPr lang="en-GB"/>
           </a:p>
@@ -1030,7 +1035,7 @@
           <a:p>
             <a:fld id="{A8D65590-5FF4-DF4F-AE90-F41104859259}" type="datetimeFigureOut">
               <a:rPr lang="en-GB" smtClean="0"/>
-              <a:t>29/01/2019</a:t>
+              <a:t>20/02/2019</a:t>
             </a:fld>
             <a:endParaRPr lang="en-GB"/>
           </a:p>
@@ -1200,7 +1205,7 @@
           <a:p>
             <a:fld id="{A8D65590-5FF4-DF4F-AE90-F41104859259}" type="datetimeFigureOut">
               <a:rPr lang="en-GB" smtClean="0"/>
-              <a:t>29/01/2019</a:t>
+              <a:t>20/02/2019</a:t>
             </a:fld>
             <a:endParaRPr lang="en-GB"/>
           </a:p>
@@ -1444,7 +1449,7 @@
           <a:p>
             <a:fld id="{A8D65590-5FF4-DF4F-AE90-F41104859259}" type="datetimeFigureOut">
               <a:rPr lang="en-GB" smtClean="0"/>
-              <a:t>29/01/2019</a:t>
+              <a:t>20/02/2019</a:t>
             </a:fld>
             <a:endParaRPr lang="en-GB"/>
           </a:p>
@@ -1676,7 +1681,7 @@
           <a:p>
             <a:fld id="{A8D65590-5FF4-DF4F-AE90-F41104859259}" type="datetimeFigureOut">
               <a:rPr lang="en-GB" smtClean="0"/>
-              <a:t>29/01/2019</a:t>
+              <a:t>20/02/2019</a:t>
             </a:fld>
             <a:endParaRPr lang="en-GB"/>
           </a:p>
@@ -2043,7 +2048,7 @@
           <a:p>
             <a:fld id="{A8D65590-5FF4-DF4F-AE90-F41104859259}" type="datetimeFigureOut">
               <a:rPr lang="en-GB" smtClean="0"/>
-              <a:t>29/01/2019</a:t>
+              <a:t>20/02/2019</a:t>
             </a:fld>
             <a:endParaRPr lang="en-GB"/>
           </a:p>
@@ -2161,7 +2166,7 @@
           <a:p>
             <a:fld id="{A8D65590-5FF4-DF4F-AE90-F41104859259}" type="datetimeFigureOut">
               <a:rPr lang="en-GB" smtClean="0"/>
-              <a:t>29/01/2019</a:t>
+              <a:t>20/02/2019</a:t>
             </a:fld>
             <a:endParaRPr lang="en-GB"/>
           </a:p>
@@ -2256,7 +2261,7 @@
           <a:p>
             <a:fld id="{A8D65590-5FF4-DF4F-AE90-F41104859259}" type="datetimeFigureOut">
               <a:rPr lang="en-GB" smtClean="0"/>
-              <a:t>29/01/2019</a:t>
+              <a:t>20/02/2019</a:t>
             </a:fld>
             <a:endParaRPr lang="en-GB"/>
           </a:p>
@@ -2533,7 +2538,7 @@
           <a:p>
             <a:fld id="{A8D65590-5FF4-DF4F-AE90-F41104859259}" type="datetimeFigureOut">
               <a:rPr lang="en-GB" smtClean="0"/>
-              <a:t>29/01/2019</a:t>
+              <a:t>20/02/2019</a:t>
             </a:fld>
             <a:endParaRPr lang="en-GB"/>
           </a:p>
@@ -2790,7 +2795,7 @@
           <a:p>
             <a:fld id="{A8D65590-5FF4-DF4F-AE90-F41104859259}" type="datetimeFigureOut">
               <a:rPr lang="en-GB" smtClean="0"/>
-              <a:t>29/01/2019</a:t>
+              <a:t>20/02/2019</a:t>
             </a:fld>
             <a:endParaRPr lang="en-GB"/>
           </a:p>
@@ -3003,7 +3008,7 @@
           <a:p>
             <a:fld id="{A8D65590-5FF4-DF4F-AE90-F41104859259}" type="datetimeFigureOut">
               <a:rPr lang="en-GB" smtClean="0"/>
-              <a:t>29/01/2019</a:t>
+              <a:t>20/02/2019</a:t>
             </a:fld>
             <a:endParaRPr lang="en-GB"/>
           </a:p>
@@ -3466,8 +3471,8 @@
         </p:nvSpPr>
         <p:spPr>
           <a:xfrm>
-            <a:off x="1685925" y="1122778"/>
-            <a:ext cx="2769365" cy="648872"/>
+            <a:off x="948107" y="1122778"/>
+            <a:ext cx="3507184" cy="648872"/>
           </a:xfrm>
           <a:prstGeom prst="roundRect">
             <a:avLst/>
@@ -3648,10 +3653,10 @@
       </p:sp>
       <p:sp>
         <p:nvSpPr>
-          <p:cNvPr id="8" name="Oval 7">
+          <p:cNvPr id="9" name="Rounded Rectangle 8">
             <a:extLst>
               <a:ext uri="{FF2B5EF4-FFF2-40B4-BE49-F238E27FC236}">
-                <a16:creationId xmlns:a16="http://schemas.microsoft.com/office/drawing/2014/main" id="{3313CC24-6807-0049-970F-FCB37B24DABE}"/>
+                <a16:creationId xmlns:a16="http://schemas.microsoft.com/office/drawing/2014/main" id="{11F0B02B-081A-1F44-A153-31BDB885A16D}"/>
               </a:ext>
             </a:extLst>
           </p:cNvPr>
@@ -3660,8 +3665,69 @@
         </p:nvSpPr>
         <p:spPr>
           <a:xfrm>
-            <a:off x="1771804" y="2046502"/>
-            <a:ext cx="1206812" cy="1138996"/>
+            <a:off x="3326300" y="2046502"/>
+            <a:ext cx="977817" cy="1138996"/>
+          </a:xfrm>
+          <a:prstGeom prst="roundRect">
+            <a:avLst/>
+          </a:prstGeom>
+        </p:spPr>
+        <p:style>
+          <a:lnRef idx="2">
+            <a:schemeClr val="accent1">
+              <a:shade val="50000"/>
+            </a:schemeClr>
+          </a:lnRef>
+          <a:fillRef idx="1">
+            <a:schemeClr val="accent1"/>
+          </a:fillRef>
+          <a:effectRef idx="0">
+            <a:schemeClr val="accent1"/>
+          </a:effectRef>
+          <a:fontRef idx="minor">
+            <a:schemeClr val="lt1"/>
+          </a:fontRef>
+        </p:style>
+        <p:txBody>
+          <a:bodyPr rot="0" spcFirstLastPara="0" vertOverflow="overflow" horzOverflow="overflow" vert="horz" wrap="square" lIns="71993" tIns="35997" rIns="71993" bIns="35997" numCol="1" spcCol="0" rtlCol="0" fromWordArt="0" anchor="ctr" anchorCtr="0" forceAA="0" compatLnSpc="1">
+            <a:prstTxWarp prst="textNoShape">
+              <a:avLst/>
+            </a:prstTxWarp>
+            <a:noAutofit/>
+          </a:bodyPr>
+          <a:lstStyle/>
+          <a:p>
+            <a:pPr algn="ctr"/>
+            <a:r>
+              <a:rPr lang="en-GB" sz="1417" dirty="0"/>
+              <a:t>Modified</a:t>
+            </a:r>
+          </a:p>
+          <a:p>
+            <a:pPr algn="ctr"/>
+            <a:r>
+              <a:rPr lang="en-GB" sz="1417" dirty="0"/>
+              <a:t>Jupyter Notebook</a:t>
+            </a:r>
+          </a:p>
+        </p:txBody>
+      </p:sp>
+      <p:sp>
+        <p:nvSpPr>
+          <p:cNvPr id="10" name="Oval 9">
+            <a:extLst>
+              <a:ext uri="{FF2B5EF4-FFF2-40B4-BE49-F238E27FC236}">
+                <a16:creationId xmlns:a16="http://schemas.microsoft.com/office/drawing/2014/main" id="{02317CFC-077C-ED41-80B0-BEDF53476F50}"/>
+              </a:ext>
+            </a:extLst>
+          </p:cNvPr>
+          <p:cNvSpPr/>
+          <p:nvPr/>
+        </p:nvSpPr>
+        <p:spPr>
+          <a:xfrm>
+            <a:off x="4651800" y="3381983"/>
+            <a:ext cx="1086707" cy="1181977"/>
           </a:xfrm>
           <a:prstGeom prst="ellipse">
             <a:avLst/>
@@ -3695,17 +3761,17 @@
             <a:pPr algn="ctr"/>
             <a:r>
               <a:rPr lang="en-GB" sz="1417" dirty="0"/>
-              <a:t>Merge &amp; Apply Pre-Processors</a:t>
-            </a:r>
-          </a:p>
-        </p:txBody>
-      </p:sp>
-      <p:sp>
-        <p:nvSpPr>
-          <p:cNvPr id="9" name="Rounded Rectangle 8">
+              <a:t>Apply Jinja Template</a:t>
+            </a:r>
+          </a:p>
+        </p:txBody>
+      </p:sp>
+      <p:sp>
+        <p:nvSpPr>
+          <p:cNvPr id="11" name="Rounded Rectangle 10">
             <a:extLst>
               <a:ext uri="{FF2B5EF4-FFF2-40B4-BE49-F238E27FC236}">
-                <a16:creationId xmlns:a16="http://schemas.microsoft.com/office/drawing/2014/main" id="{11F0B02B-081A-1F44-A153-31BDB885A16D}"/>
+                <a16:creationId xmlns:a16="http://schemas.microsoft.com/office/drawing/2014/main" id="{7698D683-9F77-B24A-ADB9-114C303DAFD1}"/>
               </a:ext>
             </a:extLst>
           </p:cNvPr>
@@ -3714,8 +3780,8 @@
         </p:nvSpPr>
         <p:spPr>
           <a:xfrm>
-            <a:off x="3326300" y="2046502"/>
-            <a:ext cx="977817" cy="1138996"/>
+            <a:off x="3326300" y="3308728"/>
+            <a:ext cx="977817" cy="660020"/>
           </a:xfrm>
           <a:prstGeom prst="roundRect">
             <a:avLst/>
@@ -3749,24 +3815,21 @@
             <a:pPr algn="ctr"/>
             <a:r>
               <a:rPr lang="en-GB" sz="1417" dirty="0"/>
-              <a:t>Modified</a:t>
-            </a:r>
-          </a:p>
-          <a:p>
-            <a:pPr algn="ctr"/>
-            <a:r>
-              <a:rPr lang="en-GB" sz="1417" dirty="0"/>
-              <a:t>Jupyter Notebook</a:t>
-            </a:r>
-          </a:p>
-        </p:txBody>
-      </p:sp>
-      <p:sp>
-        <p:nvSpPr>
-          <p:cNvPr id="10" name="Oval 9">
+              <a:t>Text Based File </a:t>
+            </a:r>
+            <a:r>
+              <a:rPr lang="en-GB" sz="945" dirty="0"/>
+              <a:t>(Tex, Html, …)</a:t>
+            </a:r>
+          </a:p>
+        </p:txBody>
+      </p:sp>
+      <p:sp>
+        <p:nvSpPr>
+          <p:cNvPr id="12" name="Oval 11">
             <a:extLst>
               <a:ext uri="{FF2B5EF4-FFF2-40B4-BE49-F238E27FC236}">
-                <a16:creationId xmlns:a16="http://schemas.microsoft.com/office/drawing/2014/main" id="{02317CFC-077C-ED41-80B0-BEDF53476F50}"/>
+                <a16:creationId xmlns:a16="http://schemas.microsoft.com/office/drawing/2014/main" id="{79EAFCF2-3D78-504C-A4BF-6711813BD924}"/>
               </a:ext>
             </a:extLst>
           </p:cNvPr>
@@ -3775,8 +3838,8 @@
         </p:nvSpPr>
         <p:spPr>
           <a:xfrm>
-            <a:off x="4651800" y="3381983"/>
-            <a:ext cx="1086707" cy="1181977"/>
+            <a:off x="1737644" y="3393592"/>
+            <a:ext cx="1240972" cy="1138996"/>
           </a:xfrm>
           <a:prstGeom prst="ellipse">
             <a:avLst/>
@@ -3810,124 +3873,24 @@
             <a:pPr algn="ctr"/>
             <a:r>
               <a:rPr lang="en-GB" sz="1417" dirty="0"/>
-              <a:t>Apply Jinja Template</a:t>
-            </a:r>
-          </a:p>
-        </p:txBody>
-      </p:sp>
-      <p:sp>
-        <p:nvSpPr>
-          <p:cNvPr id="11" name="Rounded Rectangle 10">
-            <a:extLst>
-              <a:ext uri="{FF2B5EF4-FFF2-40B4-BE49-F238E27FC236}">
-                <a16:creationId xmlns:a16="http://schemas.microsoft.com/office/drawing/2014/main" id="{7698D683-9F77-B24A-ADB9-114C303DAFD1}"/>
-              </a:ext>
-            </a:extLst>
-          </p:cNvPr>
-          <p:cNvSpPr/>
-          <p:nvPr/>
-        </p:nvSpPr>
-        <p:spPr>
-          <a:xfrm>
-            <a:off x="3326300" y="3308728"/>
-            <a:ext cx="977817" cy="660020"/>
-          </a:xfrm>
-          <a:prstGeom prst="roundRect">
-            <a:avLst/>
-          </a:prstGeom>
-        </p:spPr>
-        <p:style>
-          <a:lnRef idx="2">
-            <a:schemeClr val="accent1">
-              <a:shade val="50000"/>
-            </a:schemeClr>
-          </a:lnRef>
-          <a:fillRef idx="1">
-            <a:schemeClr val="accent1"/>
-          </a:fillRef>
-          <a:effectRef idx="0">
-            <a:schemeClr val="accent1"/>
-          </a:effectRef>
-          <a:fontRef idx="minor">
-            <a:schemeClr val="lt1"/>
-          </a:fontRef>
-        </p:style>
-        <p:txBody>
-          <a:bodyPr rot="0" spcFirstLastPara="0" vertOverflow="overflow" horzOverflow="overflow" vert="horz" wrap="square" lIns="71993" tIns="35997" rIns="71993" bIns="35997" numCol="1" spcCol="0" rtlCol="0" fromWordArt="0" anchor="ctr" anchorCtr="0" forceAA="0" compatLnSpc="1">
-            <a:prstTxWarp prst="textNoShape">
-              <a:avLst/>
-            </a:prstTxWarp>
-            <a:noAutofit/>
-          </a:bodyPr>
-          <a:lstStyle/>
+              <a:t>Post-Processing</a:t>
+            </a:r>
+          </a:p>
           <a:p>
             <a:pPr algn="ctr"/>
             <a:r>
-              <a:rPr lang="en-GB" sz="1417" dirty="0"/>
-              <a:t>Text Based File </a:t>
-            </a:r>
-            <a:r>
-              <a:rPr lang="en-GB" sz="945" dirty="0"/>
-              <a:t>(Tex, Html, …)</a:t>
-            </a:r>
-          </a:p>
-        </p:txBody>
-      </p:sp>
-      <p:sp>
-        <p:nvSpPr>
-          <p:cNvPr id="12" name="Oval 11">
-            <a:extLst>
-              <a:ext uri="{FF2B5EF4-FFF2-40B4-BE49-F238E27FC236}">
-                <a16:creationId xmlns:a16="http://schemas.microsoft.com/office/drawing/2014/main" id="{79EAFCF2-3D78-504C-A4BF-6711813BD924}"/>
-              </a:ext>
-            </a:extLst>
-          </p:cNvPr>
-          <p:cNvSpPr/>
-          <p:nvPr/>
-        </p:nvSpPr>
-        <p:spPr>
-          <a:xfrm>
-            <a:off x="1737644" y="3393592"/>
-            <a:ext cx="1240972" cy="1138996"/>
-          </a:xfrm>
-          <a:prstGeom prst="ellipse">
-            <a:avLst/>
-          </a:prstGeom>
-        </p:spPr>
-        <p:style>
-          <a:lnRef idx="2">
-            <a:schemeClr val="accent2">
-              <a:shade val="50000"/>
-            </a:schemeClr>
-          </a:lnRef>
-          <a:fillRef idx="1">
-            <a:schemeClr val="accent2"/>
-          </a:fillRef>
-          <a:effectRef idx="0">
-            <a:schemeClr val="accent2"/>
-          </a:effectRef>
-          <a:fontRef idx="minor">
-            <a:schemeClr val="lt1"/>
-          </a:fontRef>
-        </p:style>
-        <p:txBody>
-          <a:bodyPr rot="0" spcFirstLastPara="0" vertOverflow="overflow" horzOverflow="overflow" vert="horz" wrap="square" lIns="28344" tIns="35997" rIns="28344" bIns="35997" numCol="1" spcCol="0" rtlCol="0" fromWordArt="0" anchor="ctr" anchorCtr="0" forceAA="0" compatLnSpc="1">
-            <a:prstTxWarp prst="textNoShape">
-              <a:avLst/>
-            </a:prstTxWarp>
-            <a:noAutofit/>
-          </a:bodyPr>
-          <a:lstStyle/>
-          <a:p>
-            <a:pPr algn="ctr"/>
-            <a:r>
-              <a:rPr lang="en-GB" sz="1417" dirty="0" err="1"/>
+              <a:rPr lang="en-GB" sz="1100" dirty="0"/>
+              <a:t>(e.g. </a:t>
+            </a:r>
+            <a:r>
+              <a:rPr lang="en-GB" sz="1100" dirty="0" err="1"/>
               <a:t>LaTeX</a:t>
             </a:r>
             <a:r>
-              <a:rPr lang="en-GB" sz="1417" dirty="0"/>
-              <a:t> Conversion</a:t>
-            </a:r>
+              <a:rPr lang="en-GB" sz="1100" dirty="0"/>
+              <a:t> Conversion)</a:t>
+            </a:r>
+            <a:endParaRPr lang="en-GB" sz="1417" dirty="0"/>
           </a:p>
         </p:txBody>
       </p:sp>
@@ -3980,7 +3943,14 @@
             <a:pPr algn="ctr"/>
             <a:r>
               <a:rPr lang="en-GB" sz="1417" dirty="0"/>
-              <a:t>PDF Document</a:t>
+              <a:t>Final Output</a:t>
+            </a:r>
+          </a:p>
+          <a:p>
+            <a:pPr algn="ctr"/>
+            <a:r>
+              <a:rPr lang="en-GB" sz="1100" dirty="0"/>
+              <a:t>(e.g. PDF)</a:t>
             </a:r>
           </a:p>
         </p:txBody>
@@ -4524,8 +4494,8 @@
         </p:nvSpPr>
         <p:spPr>
           <a:xfrm>
-            <a:off x="1728934" y="1178390"/>
-            <a:ext cx="1292555" cy="533520"/>
+            <a:off x="997550" y="1178390"/>
+            <a:ext cx="1162742" cy="533520"/>
           </a:xfrm>
           <a:prstGeom prst="roundRect">
             <a:avLst/>
@@ -4548,7 +4518,7 @@
           </a:fontRef>
         </p:style>
         <p:txBody>
-          <a:bodyPr rot="0" spcFirstLastPara="0" vertOverflow="overflow" horzOverflow="overflow" vert="horz" wrap="square" lIns="71993" tIns="35997" rIns="71993" bIns="35997" numCol="1" spcCol="0" rtlCol="0" fromWordArt="0" anchor="ctr" anchorCtr="0" forceAA="0" compatLnSpc="1">
+          <a:bodyPr rot="0" spcFirstLastPara="0" vertOverflow="overflow" horzOverflow="overflow" vert="horz" wrap="square" lIns="36000" tIns="35997" rIns="36000" bIns="35997" numCol="1" spcCol="0" rtlCol="0" fromWordArt="0" anchor="ctr" anchorCtr="0" forceAA="0" compatLnSpc="1">
             <a:prstTxWarp prst="textNoShape">
               <a:avLst/>
             </a:prstTxWarp>
@@ -4582,8 +4552,8 @@
         </p:nvSpPr>
         <p:spPr>
           <a:xfrm>
-            <a:off x="3129051" y="1178390"/>
-            <a:ext cx="1292555" cy="533520"/>
+            <a:off x="3554959" y="1178390"/>
+            <a:ext cx="866647" cy="533520"/>
           </a:xfrm>
           <a:prstGeom prst="roundRect">
             <a:avLst/>
@@ -4606,7 +4576,7 @@
           </a:fontRef>
         </p:style>
         <p:txBody>
-          <a:bodyPr rot="0" spcFirstLastPara="0" vertOverflow="overflow" horzOverflow="overflow" vert="horz" wrap="square" lIns="71993" tIns="35997" rIns="71993" bIns="35997" numCol="1" spcCol="0" rtlCol="0" fromWordArt="0" anchor="ctr" anchorCtr="0" forceAA="0" compatLnSpc="1">
+          <a:bodyPr rot="0" spcFirstLastPara="0" vertOverflow="overflow" horzOverflow="overflow" vert="horz" wrap="square" lIns="36000" tIns="35997" rIns="36000" bIns="35997" numCol="1" spcCol="0" rtlCol="0" fromWordArt="0" anchor="ctr" anchorCtr="0" forceAA="0" compatLnSpc="1">
             <a:prstTxWarp prst="textNoShape">
               <a:avLst/>
             </a:prstTxWarp>
@@ -4754,14 +4724,14 @@
           <p:cNvCxnSpPr>
             <a:cxnSpLocks/>
             <a:stCxn id="70" idx="2"/>
-            <a:endCxn id="8" idx="0"/>
+            <a:endCxn id="8" idx="1"/>
           </p:cNvCxnSpPr>
           <p:nvPr/>
         </p:nvCxnSpPr>
         <p:spPr>
           <a:xfrm>
-            <a:off x="2375210" y="1711910"/>
-            <a:ext cx="0" cy="334592"/>
+            <a:off x="1578921" y="1711910"/>
+            <a:ext cx="369617" cy="501394"/>
           </a:xfrm>
           <a:prstGeom prst="straightConnector1">
             <a:avLst/>
@@ -4806,8 +4776,8 @@
         </p:nvCxnSpPr>
         <p:spPr>
           <a:xfrm>
-            <a:off x="4421606" y="1445152"/>
-            <a:ext cx="773547" cy="1936831"/>
+            <a:off x="4421606" y="1445150"/>
+            <a:ext cx="773548" cy="1936833"/>
           </a:xfrm>
           <a:prstGeom prst="bentConnector2">
             <a:avLst/>
@@ -4974,52 +4944,6 @@
       </p:cxnSp>
       <p:cxnSp>
         <p:nvCxnSpPr>
-          <p:cNvPr id="99" name="Straight Arrow Connector 98">
-            <a:extLst>
-              <a:ext uri="{FF2B5EF4-FFF2-40B4-BE49-F238E27FC236}">
-                <a16:creationId xmlns:a16="http://schemas.microsoft.com/office/drawing/2014/main" id="{0DC6BC67-8414-7D46-9524-ABB71C9869C5}"/>
-              </a:ext>
-            </a:extLst>
-          </p:cNvPr>
-          <p:cNvCxnSpPr>
-            <a:cxnSpLocks/>
-            <a:stCxn id="55" idx="2"/>
-            <a:endCxn id="70" idx="0"/>
-          </p:cNvCxnSpPr>
-          <p:nvPr/>
-        </p:nvCxnSpPr>
-        <p:spPr>
-          <a:xfrm flipH="1">
-            <a:off x="2375213" y="875653"/>
-            <a:ext cx="4355" cy="302739"/>
-          </a:xfrm>
-          <a:prstGeom prst="straightConnector1">
-            <a:avLst/>
-          </a:prstGeom>
-          <a:ln w="76200">
-            <a:solidFill>
-              <a:schemeClr val="accent6"/>
-            </a:solidFill>
-            <a:tailEnd type="triangle"/>
-          </a:ln>
-        </p:spPr>
-        <p:style>
-          <a:lnRef idx="1">
-            <a:schemeClr val="accent1"/>
-          </a:lnRef>
-          <a:fillRef idx="0">
-            <a:schemeClr val="accent1"/>
-          </a:fillRef>
-          <a:effectRef idx="0">
-            <a:schemeClr val="accent1"/>
-          </a:effectRef>
-          <a:fontRef idx="minor">
-            <a:schemeClr val="tx1"/>
-          </a:fontRef>
-        </p:style>
-      </p:cxnSp>
-      <p:cxnSp>
-        <p:nvCxnSpPr>
           <p:cNvPr id="105" name="Elbow Connector 104">
             <a:extLst>
               <a:ext uri="{FF2B5EF4-FFF2-40B4-BE49-F238E27FC236}">
@@ -5030,14 +4954,13 @@
           <p:cNvCxnSpPr>
             <a:cxnSpLocks/>
             <a:stCxn id="55" idx="3"/>
-            <a:endCxn id="71" idx="0"/>
           </p:cNvCxnSpPr>
           <p:nvPr/>
         </p:nvCxnSpPr>
         <p:spPr>
           <a:xfrm>
-            <a:off x="3021488" y="608895"/>
-            <a:ext cx="753840" cy="569497"/>
+            <a:off x="3021487" y="608892"/>
+            <a:ext cx="401517" cy="513886"/>
           </a:xfrm>
           <a:prstGeom prst="bentConnector2">
             <a:avLst/>
@@ -5261,6 +5184,164 @@
             <a:r>
               <a:rPr lang="en-GB" sz="945" dirty="0"/>
               <a:t>bibliography etc</a:t>
+            </a:r>
+          </a:p>
+        </p:txBody>
+      </p:sp>
+      <p:sp>
+        <p:nvSpPr>
+          <p:cNvPr id="41" name="Rounded Rectangle 40">
+            <a:extLst>
+              <a:ext uri="{FF2B5EF4-FFF2-40B4-BE49-F238E27FC236}">
+                <a16:creationId xmlns:a16="http://schemas.microsoft.com/office/drawing/2014/main" id="{CD991796-3459-C44E-9106-71265B700780}"/>
+              </a:ext>
+            </a:extLst>
+          </p:cNvPr>
+          <p:cNvSpPr/>
+          <p:nvPr/>
+        </p:nvSpPr>
+        <p:spPr>
+          <a:xfrm>
+            <a:off x="2238016" y="1174168"/>
+            <a:ext cx="1263106" cy="533520"/>
+          </a:xfrm>
+          <a:prstGeom prst="roundRect">
+            <a:avLst/>
+          </a:prstGeom>
+        </p:spPr>
+        <p:style>
+          <a:lnRef idx="2">
+            <a:schemeClr val="accent4">
+              <a:shade val="50000"/>
+            </a:schemeClr>
+          </a:lnRef>
+          <a:fillRef idx="1">
+            <a:schemeClr val="accent4"/>
+          </a:fillRef>
+          <a:effectRef idx="0">
+            <a:schemeClr val="accent4"/>
+          </a:effectRef>
+          <a:fontRef idx="minor">
+            <a:schemeClr val="lt1"/>
+          </a:fontRef>
+        </p:style>
+        <p:txBody>
+          <a:bodyPr rot="0" spcFirstLastPara="0" vertOverflow="overflow" horzOverflow="overflow" vert="horz" wrap="square" lIns="36000" tIns="35997" rIns="36000" bIns="35997" numCol="1" spcCol="0" rtlCol="0" fromWordArt="0" anchor="ctr" anchorCtr="0" forceAA="0" compatLnSpc="1">
+            <a:prstTxWarp prst="textNoShape">
+              <a:avLst/>
+            </a:prstTxWarp>
+            <a:noAutofit/>
+          </a:bodyPr>
+          <a:lstStyle/>
+          <a:p>
+            <a:pPr algn="ctr"/>
+            <a:r>
+              <a:rPr lang="en-GB" sz="1417" dirty="0">
+                <a:solidFill>
+                  <a:schemeClr val="tx1"/>
+                </a:solidFill>
+              </a:rPr>
+              <a:t>Post-Processor Classes</a:t>
+            </a:r>
+          </a:p>
+        </p:txBody>
+      </p:sp>
+      <p:cxnSp>
+        <p:nvCxnSpPr>
+          <p:cNvPr id="51" name="Straight Arrow Connector 50">
+            <a:extLst>
+              <a:ext uri="{FF2B5EF4-FFF2-40B4-BE49-F238E27FC236}">
+                <a16:creationId xmlns:a16="http://schemas.microsoft.com/office/drawing/2014/main" id="{B742822B-0706-B34A-807D-614848548445}"/>
+              </a:ext>
+            </a:extLst>
+          </p:cNvPr>
+          <p:cNvCxnSpPr>
+            <a:cxnSpLocks/>
+            <a:stCxn id="41" idx="2"/>
+            <a:endCxn id="12" idx="7"/>
+          </p:cNvCxnSpPr>
+          <p:nvPr/>
+        </p:nvCxnSpPr>
+        <p:spPr>
+          <a:xfrm flipH="1">
+            <a:off x="2796880" y="1707688"/>
+            <a:ext cx="72689" cy="1852706"/>
+          </a:xfrm>
+          <a:prstGeom prst="straightConnector1">
+            <a:avLst/>
+          </a:prstGeom>
+          <a:ln w="76200">
+            <a:solidFill>
+              <a:schemeClr val="accent4"/>
+            </a:solidFill>
+            <a:tailEnd type="triangle"/>
+          </a:ln>
+        </p:spPr>
+        <p:style>
+          <a:lnRef idx="1">
+            <a:schemeClr val="accent1"/>
+          </a:lnRef>
+          <a:fillRef idx="0">
+            <a:schemeClr val="accent1"/>
+          </a:fillRef>
+          <a:effectRef idx="0">
+            <a:schemeClr val="accent1"/>
+          </a:effectRef>
+          <a:fontRef idx="minor">
+            <a:schemeClr val="tx1"/>
+          </a:fontRef>
+        </p:style>
+      </p:cxnSp>
+      <p:sp>
+        <p:nvSpPr>
+          <p:cNvPr id="8" name="Oval 7">
+            <a:extLst>
+              <a:ext uri="{FF2B5EF4-FFF2-40B4-BE49-F238E27FC236}">
+                <a16:creationId xmlns:a16="http://schemas.microsoft.com/office/drawing/2014/main" id="{3313CC24-6807-0049-970F-FCB37B24DABE}"/>
+              </a:ext>
+            </a:extLst>
+          </p:cNvPr>
+          <p:cNvSpPr/>
+          <p:nvPr/>
+        </p:nvSpPr>
+        <p:spPr>
+          <a:xfrm>
+            <a:off x="1771804" y="2046502"/>
+            <a:ext cx="1206812" cy="1138996"/>
+          </a:xfrm>
+          <a:prstGeom prst="ellipse">
+            <a:avLst/>
+          </a:prstGeom>
+        </p:spPr>
+        <p:style>
+          <a:lnRef idx="2">
+            <a:schemeClr val="accent2">
+              <a:shade val="50000"/>
+            </a:schemeClr>
+          </a:lnRef>
+          <a:fillRef idx="1">
+            <a:schemeClr val="accent2"/>
+          </a:fillRef>
+          <a:effectRef idx="0">
+            <a:schemeClr val="accent2"/>
+          </a:effectRef>
+          <a:fontRef idx="minor">
+            <a:schemeClr val="lt1"/>
+          </a:fontRef>
+        </p:style>
+        <p:txBody>
+          <a:bodyPr rot="0" spcFirstLastPara="0" vertOverflow="overflow" horzOverflow="overflow" vert="horz" wrap="square" lIns="28344" tIns="35997" rIns="28344" bIns="35997" numCol="1" spcCol="0" rtlCol="0" fromWordArt="0" anchor="ctr" anchorCtr="0" forceAA="0" compatLnSpc="1">
+            <a:prstTxWarp prst="textNoShape">
+              <a:avLst/>
+            </a:prstTxWarp>
+            <a:noAutofit/>
+          </a:bodyPr>
+          <a:lstStyle/>
+          <a:p>
+            <a:pPr algn="ctr"/>
+            <a:r>
+              <a:rPr lang="en-GB" sz="1417" dirty="0"/>
+              <a:t>Merge &amp; Apply Pre-Processors</a:t>
             </a:r>
           </a:p>
         </p:txBody>

</xml_diff>